<commit_message>
Demo PPT - Updated
</commit_message>
<xml_diff>
--- a/Demo PPT/Demo Template.pptx
+++ b/Demo PPT/Demo Template.pptx
@@ -10,12 +10,13 @@
     <p:sldId id="262" r:id="rId4"/>
     <p:sldId id="258" r:id="rId5"/>
     <p:sldId id="257" r:id="rId6"/>
-    <p:sldId id="259" r:id="rId7"/>
-    <p:sldId id="265" r:id="rId8"/>
-    <p:sldId id="263" r:id="rId9"/>
-    <p:sldId id="261" r:id="rId10"/>
-    <p:sldId id="264" r:id="rId11"/>
-    <p:sldId id="267" r:id="rId12"/>
+    <p:sldId id="268" r:id="rId7"/>
+    <p:sldId id="269" r:id="rId8"/>
+    <p:sldId id="265" r:id="rId9"/>
+    <p:sldId id="263" r:id="rId10"/>
+    <p:sldId id="261" r:id="rId11"/>
+    <p:sldId id="264" r:id="rId12"/>
+    <p:sldId id="267" r:id="rId13"/>
   </p:sldIdLst>
   <p:sldSz cx="12192000" cy="6858000"/>
   <p:notesSz cx="6858000" cy="9144000"/>
@@ -8915,7 +8916,7 @@
           <a:p>
             <a:fld id="{58650000-1312-4325-B0B3-8300E774D32D}" type="datetimeFigureOut">
               <a:rPr lang="en-IN" smtClean="0"/>
-              <a:t>15-07-2022</a:t>
+              <a:t>17-07-2022</a:t>
             </a:fld>
             <a:endParaRPr lang="en-IN"/>
           </a:p>
@@ -9122,7 +9123,7 @@
           <a:p>
             <a:fld id="{58650000-1312-4325-B0B3-8300E774D32D}" type="datetimeFigureOut">
               <a:rPr lang="en-IN" smtClean="0"/>
-              <a:t>15-07-2022</a:t>
+              <a:t>17-07-2022</a:t>
             </a:fld>
             <a:endParaRPr lang="en-IN"/>
           </a:p>
@@ -9302,7 +9303,7 @@
           <a:p>
             <a:fld id="{58650000-1312-4325-B0B3-8300E774D32D}" type="datetimeFigureOut">
               <a:rPr lang="en-IN" smtClean="0"/>
-              <a:t>15-07-2022</a:t>
+              <a:t>17-07-2022</a:t>
             </a:fld>
             <a:endParaRPr lang="en-IN"/>
           </a:p>
@@ -9507,7 +9508,7 @@
           <a:p>
             <a:fld id="{58650000-1312-4325-B0B3-8300E774D32D}" type="datetimeFigureOut">
               <a:rPr lang="en-IN" smtClean="0"/>
-              <a:t>15-07-2022</a:t>
+              <a:t>17-07-2022</a:t>
             </a:fld>
             <a:endParaRPr lang="en-IN"/>
           </a:p>
@@ -18405,7 +18406,7 @@
           <a:p>
             <a:fld id="{58650000-1312-4325-B0B3-8300E774D32D}" type="datetimeFigureOut">
               <a:rPr lang="en-IN" smtClean="0"/>
-              <a:t>15-07-2022</a:t>
+              <a:t>17-07-2022</a:t>
             </a:fld>
             <a:endParaRPr lang="en-IN"/>
           </a:p>
@@ -18679,7 +18680,7 @@
           <a:p>
             <a:fld id="{58650000-1312-4325-B0B3-8300E774D32D}" type="datetimeFigureOut">
               <a:rPr lang="en-IN" smtClean="0"/>
-              <a:t>15-07-2022</a:t>
+              <a:t>17-07-2022</a:t>
             </a:fld>
             <a:endParaRPr lang="en-IN"/>
           </a:p>
@@ -19077,7 +19078,7 @@
           <a:p>
             <a:fld id="{58650000-1312-4325-B0B3-8300E774D32D}" type="datetimeFigureOut">
               <a:rPr lang="en-IN" smtClean="0"/>
-              <a:t>15-07-2022</a:t>
+              <a:t>17-07-2022</a:t>
             </a:fld>
             <a:endParaRPr lang="en-IN"/>
           </a:p>
@@ -19195,7 +19196,7 @@
           <a:p>
             <a:fld id="{58650000-1312-4325-B0B3-8300E774D32D}" type="datetimeFigureOut">
               <a:rPr lang="en-IN" smtClean="0"/>
-              <a:t>15-07-2022</a:t>
+              <a:t>17-07-2022</a:t>
             </a:fld>
             <a:endParaRPr lang="en-IN"/>
           </a:p>
@@ -19290,7 +19291,7 @@
           <a:p>
             <a:fld id="{58650000-1312-4325-B0B3-8300E774D32D}" type="datetimeFigureOut">
               <a:rPr lang="en-IN" smtClean="0"/>
-              <a:t>15-07-2022</a:t>
+              <a:t>17-07-2022</a:t>
             </a:fld>
             <a:endParaRPr lang="en-IN"/>
           </a:p>
@@ -19580,7 +19581,7 @@
           <a:p>
             <a:fld id="{58650000-1312-4325-B0B3-8300E774D32D}" type="datetimeFigureOut">
               <a:rPr lang="en-IN" smtClean="0"/>
-              <a:t>15-07-2022</a:t>
+              <a:t>17-07-2022</a:t>
             </a:fld>
             <a:endParaRPr lang="en-IN"/>
           </a:p>
@@ -19860,7 +19861,7 @@
           <a:p>
             <a:fld id="{58650000-1312-4325-B0B3-8300E774D32D}" type="datetimeFigureOut">
               <a:rPr lang="en-IN" smtClean="0"/>
-              <a:t>15-07-2022</a:t>
+              <a:t>17-07-2022</a:t>
             </a:fld>
             <a:endParaRPr lang="en-IN"/>
           </a:p>
@@ -20110,7 +20111,7 @@
           <a:p>
             <a:fld id="{58650000-1312-4325-B0B3-8300E774D32D}" type="datetimeFigureOut">
               <a:rPr lang="en-IN" smtClean="0"/>
-              <a:t>15-07-2022</a:t>
+              <a:t>17-07-2022</a:t>
             </a:fld>
             <a:endParaRPr lang="en-IN"/>
           </a:p>
@@ -20708,6 +20709,96 @@
           <p:cNvPr id="2" name="Title 1">
             <a:extLst>
               <a:ext uri="{FF2B5EF4-FFF2-40B4-BE49-F238E27FC236}">
+                <a16:creationId xmlns:a16="http://schemas.microsoft.com/office/drawing/2014/main" id="{D0FC0C6B-78B2-6B27-9973-596280C5D6E3}"/>
+              </a:ext>
+            </a:extLst>
+          </p:cNvPr>
+          <p:cNvSpPr>
+            <a:spLocks noGrp="1"/>
+          </p:cNvSpPr>
+          <p:nvPr>
+            <p:ph type="title"/>
+          </p:nvPr>
+        </p:nvSpPr>
+        <p:spPr/>
+        <p:txBody>
+          <a:bodyPr/>
+          <a:lstStyle/>
+          <a:p>
+            <a:r>
+              <a:rPr lang="en-IN" dirty="0"/>
+              <a:t>DEMO</a:t>
+            </a:r>
+          </a:p>
+        </p:txBody>
+      </p:sp>
+      <p:sp>
+        <p:nvSpPr>
+          <p:cNvPr id="3" name="Content Placeholder 2">
+            <a:extLst>
+              <a:ext uri="{FF2B5EF4-FFF2-40B4-BE49-F238E27FC236}">
+                <a16:creationId xmlns:a16="http://schemas.microsoft.com/office/drawing/2014/main" id="{4B32D1D6-8BDE-BA31-ACBD-E5D8E3F5486C}"/>
+              </a:ext>
+            </a:extLst>
+          </p:cNvPr>
+          <p:cNvSpPr>
+            <a:spLocks noGrp="1"/>
+          </p:cNvSpPr>
+          <p:nvPr>
+            <p:ph idx="1"/>
+          </p:nvPr>
+        </p:nvSpPr>
+        <p:spPr/>
+        <p:txBody>
+          <a:bodyPr/>
+          <a:lstStyle/>
+          <a:p>
+            <a:pPr>
+              <a:buFont typeface="Wingdings" panose="05000000000000000000" pitchFamily="2" charset="2"/>
+              <a:buChar char="v"/>
+            </a:pPr>
+            <a:r>
+              <a:rPr lang="en-IN" dirty="0"/>
+              <a:t> </a:t>
+            </a:r>
+          </a:p>
+        </p:txBody>
+      </p:sp>
+    </p:spTree>
+    <p:extLst>
+      <p:ext uri="{BB962C8B-B14F-4D97-AF65-F5344CB8AC3E}">
+        <p14:creationId xmlns:p14="http://schemas.microsoft.com/office/powerpoint/2010/main" val="2823406662"/>
+      </p:ext>
+    </p:extLst>
+  </p:cSld>
+  <p:clrMapOvr>
+    <a:masterClrMapping/>
+  </p:clrMapOvr>
+</p:sld>
+</file>
+
+<file path=ppt/slides/slide11.xml><?xml version="1.0" encoding="utf-8"?>
+<p:sld xmlns:a="http://schemas.openxmlformats.org/drawingml/2006/main" xmlns:r="http://schemas.openxmlformats.org/officeDocument/2006/relationships" xmlns:p="http://schemas.openxmlformats.org/presentationml/2006/main">
+  <p:cSld>
+    <p:spTree>
+      <p:nvGrpSpPr>
+        <p:cNvPr id="1" name=""/>
+        <p:cNvGrpSpPr/>
+        <p:nvPr/>
+      </p:nvGrpSpPr>
+      <p:grpSpPr>
+        <a:xfrm>
+          <a:off x="0" y="0"/>
+          <a:ext cx="0" cy="0"/>
+          <a:chOff x="0" y="0"/>
+          <a:chExt cx="0" cy="0"/>
+        </a:xfrm>
+      </p:grpSpPr>
+      <p:sp>
+        <p:nvSpPr>
+          <p:cNvPr id="2" name="Title 1">
+            <a:extLst>
+              <a:ext uri="{FF2B5EF4-FFF2-40B4-BE49-F238E27FC236}">
                 <a16:creationId xmlns:a16="http://schemas.microsoft.com/office/drawing/2014/main" id="{094A78D8-F6D6-CCCF-B3EA-45FB48F5B781}"/>
               </a:ext>
             </a:extLst>
@@ -20747,9 +20838,16 @@
             <p:ph idx="1"/>
           </p:nvPr>
         </p:nvSpPr>
-        <p:spPr/>
+        <p:spPr>
+          <a:xfrm>
+            <a:off x="1024128" y="1971343"/>
+            <a:ext cx="9720073" cy="4338017"/>
+          </a:xfrm>
+        </p:spPr>
         <p:txBody>
-          <a:bodyPr/>
+          <a:bodyPr>
+            <a:normAutofit/>
+          </a:bodyPr>
           <a:lstStyle/>
           <a:p>
             <a:pPr>
@@ -20757,8 +20855,19 @@
               <a:buChar char="v"/>
             </a:pPr>
             <a:r>
-              <a:rPr lang="en-IN" dirty="0"/>
-              <a:t>List</a:t>
+              <a:rPr lang="en-US" dirty="0"/>
+              <a:t>To understand the system of the project which we do.</a:t>
+            </a:r>
+            <a:endParaRPr lang="en-IN" dirty="0"/>
+          </a:p>
+          <a:p>
+            <a:pPr>
+              <a:buFont typeface="Wingdings" panose="05000000000000000000" pitchFamily="2" charset="2"/>
+              <a:buChar char="v"/>
+            </a:pPr>
+            <a:r>
+              <a:rPr lang="en-US" dirty="0"/>
+              <a:t>Requirement gathering is the first-most thing to be done.</a:t>
             </a:r>
           </a:p>
           <a:p>
@@ -20767,8 +20876,8 @@
               <a:buChar char="v"/>
             </a:pPr>
             <a:r>
-              <a:rPr lang="en-IN" dirty="0"/>
-              <a:t>List</a:t>
+              <a:rPr lang="en-US" dirty="0"/>
+              <a:t>To think from the end-user’s perspective.</a:t>
             </a:r>
           </a:p>
           <a:p>
@@ -20777,9 +20886,50 @@
               <a:buChar char="v"/>
             </a:pPr>
             <a:r>
-              <a:rPr lang="en-IN" dirty="0"/>
-              <a:t>List</a:t>
+              <a:rPr lang="en-US" dirty="0"/>
+              <a:t>User-stories should tell about the flow of the system.</a:t>
             </a:r>
+          </a:p>
+          <a:p>
+            <a:pPr>
+              <a:buFont typeface="Wingdings" panose="05000000000000000000" pitchFamily="2" charset="2"/>
+              <a:buChar char="v"/>
+            </a:pPr>
+            <a:r>
+              <a:rPr lang="en-US" dirty="0"/>
+              <a:t>Wireframe should reflect the original output.</a:t>
+            </a:r>
+          </a:p>
+          <a:p>
+            <a:pPr>
+              <a:buFont typeface="Wingdings" panose="05000000000000000000" pitchFamily="2" charset="2"/>
+              <a:buChar char="v"/>
+            </a:pPr>
+            <a:r>
+              <a:rPr lang="en-US" dirty="0"/>
+              <a:t>Set-up documentation should be written simple for the user manual for easy understanding.</a:t>
+            </a:r>
+          </a:p>
+          <a:p>
+            <a:pPr>
+              <a:buFont typeface="Wingdings" panose="05000000000000000000" pitchFamily="2" charset="2"/>
+              <a:buChar char="v"/>
+            </a:pPr>
+            <a:r>
+              <a:rPr lang="en-US" dirty="0"/>
+              <a:t>Unused and Dead codes should be removed.</a:t>
+            </a:r>
+          </a:p>
+          <a:p>
+            <a:pPr>
+              <a:buFont typeface="Wingdings" panose="05000000000000000000" pitchFamily="2" charset="2"/>
+              <a:buChar char="v"/>
+            </a:pPr>
+            <a:r>
+              <a:rPr lang="en-US" dirty="0"/>
+              <a:t>Comments should be added for understanding.</a:t>
+            </a:r>
+            <a:endParaRPr lang="en-IN" dirty="0"/>
           </a:p>
         </p:txBody>
       </p:sp>
@@ -20796,7 +20946,7 @@
 </p:sld>
 </file>
 
-<file path=ppt/slides/slide11.xml><?xml version="1.0" encoding="utf-8"?>
+<file path=ppt/slides/slide12.xml><?xml version="1.0" encoding="utf-8"?>
 <p:sld xmlns:a="http://schemas.openxmlformats.org/drawingml/2006/main" xmlns:r="http://schemas.openxmlformats.org/officeDocument/2006/relationships" xmlns:p="http://schemas.openxmlformats.org/presentationml/2006/main">
   <p:cSld>
     <p:spTree>
@@ -20829,15 +20979,51 @@
             <p:ph type="title"/>
           </p:nvPr>
         </p:nvSpPr>
-        <p:spPr/>
+        <p:spPr>
+          <a:xfrm>
+            <a:off x="3988345" y="2594470"/>
+            <a:ext cx="9720072" cy="1499616"/>
+          </a:xfrm>
+        </p:spPr>
         <p:txBody>
-          <a:bodyPr/>
+          <a:bodyPr>
+            <a:normAutofit/>
+          </a:bodyPr>
           <a:lstStyle/>
           <a:p>
             <a:r>
-              <a:rPr lang="en-IN" dirty="0"/>
+              <a:rPr lang="en-IN" sz="4000" dirty="0">
+                <a:solidFill>
+                  <a:schemeClr val="bg1">
+                    <a:lumMod val="10000"/>
+                  </a:schemeClr>
+                </a:solidFill>
+              </a:rPr>
               <a:t>THANK YOU</a:t>
             </a:r>
+            <a:r>
+              <a:rPr lang="en-US" sz="4000" dirty="0">
+                <a:solidFill>
+                  <a:schemeClr val="bg1">
+                    <a:lumMod val="10000"/>
+                  </a:schemeClr>
+                </a:solidFill>
+              </a:rPr>
+              <a:t> - </a:t>
+            </a:r>
+            <a:r>
+              <a:rPr lang="en-US" sz="4000" dirty="0">
+                <a:solidFill>
+                  <a:srgbClr val="7030A0"/>
+                </a:solidFill>
+              </a:rPr>
+              <a:t>Team alpha</a:t>
+            </a:r>
+            <a:endParaRPr lang="en-IN" sz="4000" dirty="0">
+              <a:solidFill>
+                <a:srgbClr val="7030A0"/>
+              </a:solidFill>
+            </a:endParaRPr>
           </a:p>
         </p:txBody>
       </p:sp>
@@ -20887,7 +21073,12 @@
             <p:ph type="title"/>
           </p:nvPr>
         </p:nvSpPr>
-        <p:spPr/>
+        <p:spPr>
+          <a:xfrm>
+            <a:off x="1024128" y="566534"/>
+            <a:ext cx="9720072" cy="1499616"/>
+          </a:xfrm>
+        </p:spPr>
         <p:txBody>
           <a:bodyPr/>
           <a:lstStyle/>
@@ -20915,9 +21106,16 @@
             <p:ph idx="1"/>
           </p:nvPr>
         </p:nvSpPr>
-        <p:spPr/>
+        <p:spPr>
+          <a:xfrm>
+            <a:off x="1024128" y="1838657"/>
+            <a:ext cx="9720073" cy="4681940"/>
+          </a:xfrm>
+        </p:spPr>
         <p:txBody>
-          <a:bodyPr/>
+          <a:bodyPr numCol="2">
+            <a:normAutofit/>
+          </a:bodyPr>
           <a:lstStyle/>
           <a:p>
             <a:pPr>
@@ -20925,8 +21123,12 @@
               <a:buChar char="v"/>
             </a:pPr>
             <a:r>
-              <a:rPr lang="en-IN" dirty="0"/>
-              <a:t> List your team members </a:t>
+              <a:rPr lang="en-US" dirty="0" err="1"/>
+              <a:t>Aravindhan</a:t>
+            </a:r>
+            <a:r>
+              <a:rPr lang="en-US" dirty="0"/>
+              <a:t> Ra </a:t>
             </a:r>
           </a:p>
           <a:p>
@@ -20935,9 +21137,167 @@
               <a:buChar char="v"/>
             </a:pPr>
             <a:r>
+              <a:rPr lang="en-US" dirty="0"/>
+              <a:t>Darshana A</a:t>
+            </a:r>
+          </a:p>
+          <a:p>
+            <a:pPr>
+              <a:buFont typeface="Wingdings" panose="05000000000000000000" pitchFamily="2" charset="2"/>
+              <a:buChar char="v"/>
+            </a:pPr>
+            <a:r>
+              <a:rPr lang="en-US" dirty="0"/>
+              <a:t>Deepika S</a:t>
+            </a:r>
+          </a:p>
+          <a:p>
+            <a:pPr>
+              <a:buFont typeface="Wingdings" panose="05000000000000000000" pitchFamily="2" charset="2"/>
+              <a:buChar char="v"/>
+            </a:pPr>
+            <a:r>
+              <a:rPr lang="en-US" dirty="0"/>
+              <a:t>Gokul P</a:t>
+            </a:r>
+          </a:p>
+          <a:p>
+            <a:pPr>
+              <a:buFont typeface="Wingdings" panose="05000000000000000000" pitchFamily="2" charset="2"/>
+              <a:buChar char="v"/>
+            </a:pPr>
+            <a:r>
+              <a:rPr lang="en-US" dirty="0" err="1"/>
+              <a:t>Kumaresh</a:t>
+            </a:r>
+            <a:r>
+              <a:rPr lang="en-US" dirty="0"/>
+              <a:t> S</a:t>
+            </a:r>
+          </a:p>
+          <a:p>
+            <a:pPr>
+              <a:buFont typeface="Wingdings" panose="05000000000000000000" pitchFamily="2" charset="2"/>
+              <a:buChar char="v"/>
+            </a:pPr>
+            <a:r>
+              <a:rPr lang="en-US" dirty="0"/>
+              <a:t>Prithvi Raj P</a:t>
+            </a:r>
+          </a:p>
+          <a:p>
+            <a:pPr>
+              <a:buFont typeface="Wingdings" panose="05000000000000000000" pitchFamily="2" charset="2"/>
+              <a:buChar char="v"/>
+            </a:pPr>
+            <a:r>
+              <a:rPr lang="en-US" dirty="0" err="1"/>
+              <a:t>Remuki</a:t>
+            </a:r>
+            <a:r>
+              <a:rPr lang="en-US" dirty="0"/>
+              <a:t> S</a:t>
+            </a:r>
+          </a:p>
+          <a:p>
+            <a:pPr>
+              <a:buFont typeface="Wingdings" panose="05000000000000000000" pitchFamily="2" charset="2"/>
+              <a:buChar char="v"/>
+            </a:pPr>
+            <a:r>
+              <a:rPr lang="en-US" dirty="0"/>
+              <a:t>Sheik </a:t>
+            </a:r>
+            <a:r>
+              <a:rPr lang="en-US" dirty="0" err="1"/>
+              <a:t>Fareeth</a:t>
+            </a:r>
+            <a:r>
+              <a:rPr lang="en-US" dirty="0"/>
+              <a:t> H</a:t>
+            </a:r>
+          </a:p>
+          <a:p>
+            <a:pPr>
+              <a:buFont typeface="Wingdings" panose="05000000000000000000" pitchFamily="2" charset="2"/>
+              <a:buChar char="v"/>
+            </a:pPr>
+            <a:r>
+              <a:rPr lang="en-US" dirty="0"/>
+              <a:t>Vinoth J</a:t>
+            </a:r>
+            <a:endParaRPr lang="en-IN" dirty="0"/>
+          </a:p>
+          <a:p>
+            <a:pPr>
+              <a:buFont typeface="Wingdings" panose="05000000000000000000" pitchFamily="2" charset="2"/>
+              <a:buChar char="v"/>
+            </a:pPr>
+            <a:endParaRPr lang="en-US" dirty="0"/>
+          </a:p>
+          <a:p>
+            <a:pPr>
+              <a:buFont typeface="Wingdings" panose="05000000000000000000" pitchFamily="2" charset="2"/>
+              <a:buChar char="v"/>
+            </a:pPr>
+            <a:endParaRPr lang="en-US" dirty="0"/>
+          </a:p>
+          <a:p>
+            <a:pPr>
+              <a:buFont typeface="Wingdings" panose="05000000000000000000" pitchFamily="2" charset="2"/>
+              <a:buChar char="v"/>
+            </a:pPr>
+            <a:endParaRPr lang="en-US" dirty="0"/>
+          </a:p>
+          <a:p>
+            <a:pPr>
+              <a:buFont typeface="Wingdings" panose="05000000000000000000" pitchFamily="2" charset="2"/>
+              <a:buChar char="v"/>
+            </a:pPr>
+            <a:endParaRPr lang="en-US" dirty="0"/>
+          </a:p>
+          <a:p>
+            <a:pPr>
+              <a:buFont typeface="Wingdings" panose="05000000000000000000" pitchFamily="2" charset="2"/>
+              <a:buChar char="v"/>
+            </a:pPr>
+            <a:endParaRPr lang="en-US" dirty="0"/>
+          </a:p>
+          <a:p>
+            <a:pPr>
+              <a:buFont typeface="Wingdings" panose="05000000000000000000" pitchFamily="2" charset="2"/>
+              <a:buChar char="v"/>
+            </a:pPr>
+            <a:endParaRPr lang="en-US" dirty="0"/>
+          </a:p>
+          <a:p>
+            <a:pPr>
+              <a:buFont typeface="Wingdings" panose="05000000000000000000" pitchFamily="2" charset="2"/>
+              <a:buChar char="v"/>
+            </a:pPr>
+            <a:endParaRPr lang="en-US" dirty="0"/>
+          </a:p>
+          <a:p>
+            <a:pPr>
+              <a:buFont typeface="Wingdings" panose="05000000000000000000" pitchFamily="2" charset="2"/>
+              <a:buChar char="v"/>
+            </a:pPr>
+            <a:endParaRPr lang="en-US" dirty="0"/>
+          </a:p>
+          <a:p>
+            <a:pPr>
+              <a:buFont typeface="Wingdings" panose="05000000000000000000" pitchFamily="2" charset="2"/>
+              <a:buChar char="v"/>
+            </a:pPr>
+            <a:r>
               <a:rPr lang="en-IN" dirty="0"/>
-              <a:t> Project Duration in Days : &lt;NN&gt;</a:t>
+              <a:t> Project Duration in Days : </a:t>
             </a:r>
+            <a:r>
+              <a:rPr lang="en-US" dirty="0"/>
+              <a:t>76 days</a:t>
+            </a:r>
+            <a:endParaRPr lang="en-IN" dirty="0"/>
           </a:p>
         </p:txBody>
       </p:sp>
@@ -20987,7 +21347,12 @@
             <p:ph type="title"/>
           </p:nvPr>
         </p:nvSpPr>
-        <p:spPr/>
+        <p:spPr>
+          <a:xfrm>
+            <a:off x="1024128" y="548640"/>
+            <a:ext cx="9720072" cy="1499616"/>
+          </a:xfrm>
+        </p:spPr>
         <p:txBody>
           <a:bodyPr/>
           <a:lstStyle/>
@@ -21015,9 +21380,16 @@
             <p:ph idx="1"/>
           </p:nvPr>
         </p:nvSpPr>
-        <p:spPr/>
+        <p:spPr>
+          <a:xfrm>
+            <a:off x="1024128" y="1810224"/>
+            <a:ext cx="10143744" cy="4499136"/>
+          </a:xfrm>
+        </p:spPr>
         <p:txBody>
-          <a:bodyPr/>
+          <a:bodyPr anchor="t">
+            <a:normAutofit fontScale="92500" lnSpcReduction="10000"/>
+          </a:bodyPr>
           <a:lstStyle/>
           <a:p>
             <a:pPr>
@@ -21025,17 +21397,175 @@
               <a:buChar char="v"/>
             </a:pPr>
             <a:r>
-              <a:rPr lang="en-IN" dirty="0"/>
-              <a:t> Provide the description and intended users of the system. (</a:t>
+              <a:rPr lang="en-US" sz="2000" b="0" i="0" dirty="0">
+                <a:effectLst/>
+                <a:latin typeface="-apple-system"/>
+              </a:rPr>
+              <a:t>Interview Management System </a:t>
             </a:r>
             <a:r>
-              <a:rPr lang="en-IN" dirty="0" err="1"/>
-              <a:t>i.e</a:t>
+              <a:rPr lang="en-IN" sz="2000" b="0" i="0" dirty="0">
+                <a:effectLst/>
+                <a:latin typeface="-apple-system"/>
+              </a:rPr>
+              <a:t>is developed for the users inside our office.</a:t>
+            </a:r>
+            <a:endParaRPr lang="en-US" sz="2000" dirty="0">
+              <a:latin typeface="-apple-system"/>
+            </a:endParaRPr>
+          </a:p>
+          <a:p>
+            <a:pPr>
+              <a:buFont typeface="Wingdings" panose="05000000000000000000" pitchFamily="2" charset="2"/>
+              <a:buChar char="v"/>
+            </a:pPr>
+            <a:endParaRPr lang="en-US" sz="2000" b="0" i="0" dirty="0">
+              <a:effectLst/>
+              <a:latin typeface="-apple-system"/>
+            </a:endParaRPr>
+          </a:p>
+          <a:p>
+            <a:pPr>
+              <a:buFont typeface="Wingdings" panose="05000000000000000000" pitchFamily="2" charset="2"/>
+              <a:buChar char="v"/>
+            </a:pPr>
+            <a:r>
+              <a:rPr lang="en-IN" sz="2000" b="0" i="0" dirty="0">
+                <a:effectLst/>
+                <a:latin typeface="-apple-system"/>
+              </a:rPr>
+              <a:t>The main purpose of this platform is to</a:t>
             </a:r>
             <a:r>
-              <a:rPr lang="en-IN" dirty="0"/>
-              <a:t>, ROLES)</a:t>
+              <a:rPr lang="en-US" sz="2000" b="0" i="0" dirty="0">
+                <a:effectLst/>
+                <a:latin typeface="-apple-system"/>
+              </a:rPr>
+              <a:t> schedule drives and to collect the availabilities of the interviewers and to measure the performance of each interviewer.</a:t>
             </a:r>
+          </a:p>
+          <a:p>
+            <a:pPr>
+              <a:buFont typeface="Wingdings" panose="05000000000000000000" pitchFamily="2" charset="2"/>
+              <a:buChar char="v"/>
+            </a:pPr>
+            <a:endParaRPr lang="en-US" sz="2000" b="0" i="0" dirty="0">
+              <a:effectLst/>
+              <a:latin typeface="-apple-system"/>
+            </a:endParaRPr>
+          </a:p>
+          <a:p>
+            <a:pPr>
+              <a:buFont typeface="Wingdings" panose="05000000000000000000" pitchFamily="2" charset="2"/>
+              <a:buChar char="v"/>
+            </a:pPr>
+            <a:r>
+              <a:rPr lang="en-IN" sz="2000" b="0" i="0" dirty="0">
+                <a:effectLst/>
+                <a:latin typeface="-apple-system"/>
+              </a:rPr>
+              <a:t>Normal employee of the company will be the users.</a:t>
+            </a:r>
+            <a:endParaRPr lang="en-US" sz="2000" b="0" i="0" dirty="0">
+              <a:effectLst/>
+              <a:latin typeface="-apple-system"/>
+            </a:endParaRPr>
+          </a:p>
+          <a:p>
+            <a:pPr>
+              <a:buFont typeface="Wingdings" panose="05000000000000000000" pitchFamily="2" charset="2"/>
+              <a:buChar char="v"/>
+            </a:pPr>
+            <a:endParaRPr lang="en-US" sz="2000" b="0" i="0" dirty="0">
+              <a:effectLst/>
+              <a:latin typeface="-apple-system"/>
+            </a:endParaRPr>
+          </a:p>
+          <a:p>
+            <a:pPr>
+              <a:buFont typeface="Wingdings" panose="05000000000000000000" pitchFamily="2" charset="2"/>
+              <a:buChar char="v"/>
+            </a:pPr>
+            <a:r>
+              <a:rPr lang="en-US" sz="2000" b="0" i="0" dirty="0">
+                <a:effectLst/>
+                <a:latin typeface="-apple-system"/>
+              </a:rPr>
+              <a:t>Management person</a:t>
+            </a:r>
+            <a:r>
+              <a:rPr lang="en-IN" sz="2000" b="0" i="0" dirty="0">
+                <a:effectLst/>
+                <a:latin typeface="-apple-system"/>
+              </a:rPr>
+              <a:t> is </a:t>
+            </a:r>
+            <a:r>
+              <a:rPr lang="en-US" sz="2000" b="0" i="0" dirty="0">
+                <a:effectLst/>
+                <a:latin typeface="-apple-system"/>
+              </a:rPr>
+              <a:t>the one who can view the performance of the interviewers of his/her department. So, this </a:t>
+            </a:r>
+            <a:r>
+              <a:rPr lang="en-IN" sz="2000" b="0" i="0" dirty="0">
+                <a:effectLst/>
+                <a:latin typeface="-apple-system"/>
+              </a:rPr>
+              <a:t>an extra privilege given to the users.</a:t>
+            </a:r>
+            <a:r>
+              <a:rPr lang="en-US" sz="2000" b="0" i="0" dirty="0">
+                <a:effectLst/>
+                <a:latin typeface="-apple-system"/>
+              </a:rPr>
+              <a:t> </a:t>
+            </a:r>
+          </a:p>
+          <a:p>
+            <a:pPr>
+              <a:buFont typeface="Wingdings" panose="05000000000000000000" pitchFamily="2" charset="2"/>
+              <a:buChar char="v"/>
+            </a:pPr>
+            <a:endParaRPr lang="en-US" sz="2000" b="0" i="0" dirty="0">
+              <a:effectLst/>
+              <a:latin typeface="-apple-system"/>
+            </a:endParaRPr>
+          </a:p>
+          <a:p>
+            <a:pPr>
+              <a:buFont typeface="Wingdings" panose="05000000000000000000" pitchFamily="2" charset="2"/>
+              <a:buChar char="v"/>
+            </a:pPr>
+            <a:r>
+              <a:rPr lang="en-IN" sz="2000" u="none" strike="noStrike" dirty="0">
+                <a:effectLst/>
+                <a:latin typeface="-apple-system"/>
+              </a:rPr>
+              <a:t> Admin is another user</a:t>
+            </a:r>
+            <a:r>
+              <a:rPr lang="en-US" sz="2000" u="none" strike="noStrike" dirty="0">
+                <a:effectLst/>
+                <a:latin typeface="-apple-system"/>
+              </a:rPr>
+              <a:t>, </a:t>
+            </a:r>
+            <a:r>
+              <a:rPr lang="en-IN" sz="2000" u="none" strike="noStrike" dirty="0">
+                <a:effectLst/>
+                <a:latin typeface="-apple-system"/>
+              </a:rPr>
+              <a:t>who has the permission to verify the register user and allow the user to access the website</a:t>
+            </a:r>
+            <a:r>
+              <a:rPr lang="en-US" sz="2000" u="none" strike="noStrike" dirty="0">
+                <a:effectLst/>
+                <a:latin typeface="-apple-system"/>
+              </a:rPr>
+              <a:t> and to manage the Departments, Locations, Projects and Roles of our company.</a:t>
+            </a:r>
+            <a:endParaRPr lang="en-IN" sz="2000" dirty="0"/>
           </a:p>
         </p:txBody>
       </p:sp>
@@ -21123,17 +21653,119 @@
               <a:buChar char="v"/>
             </a:pPr>
             <a:r>
-              <a:rPr lang="en-IN" dirty="0"/>
-              <a:t>List out all the pain points (</a:t>
+              <a:rPr lang="en-IN" b="0" i="0" dirty="0">
+                <a:solidFill>
+                  <a:srgbClr val="242424"/>
+                </a:solidFill>
+                <a:effectLst/>
+                <a:latin typeface="-apple-system"/>
+              </a:rPr>
+              <a:t>It is very tough to organize a drive</a:t>
             </a:r>
             <a:r>
-              <a:rPr lang="en-IN" dirty="0" err="1"/>
-              <a:t>i.e</a:t>
+              <a:rPr lang="en-US" b="0" i="0" dirty="0">
+                <a:solidFill>
+                  <a:srgbClr val="242424"/>
+                </a:solidFill>
+                <a:effectLst/>
+                <a:latin typeface="-apple-system"/>
+              </a:rPr>
+              <a:t>.</a:t>
+            </a:r>
+          </a:p>
+          <a:p>
+            <a:pPr>
+              <a:buFont typeface="Wingdings" panose="05000000000000000000" pitchFamily="2" charset="2"/>
+              <a:buChar char="v"/>
+            </a:pPr>
+            <a:endParaRPr lang="en-US" dirty="0">
+              <a:solidFill>
+                <a:srgbClr val="242424"/>
+              </a:solidFill>
+              <a:latin typeface="-apple-system"/>
+            </a:endParaRPr>
+          </a:p>
+          <a:p>
+            <a:pPr>
+              <a:buFont typeface="Wingdings" panose="05000000000000000000" pitchFamily="2" charset="2"/>
+              <a:buChar char="v"/>
+            </a:pPr>
+            <a:r>
+              <a:rPr lang="en-US" b="0" i="0" dirty="0">
+                <a:solidFill>
+                  <a:srgbClr val="242424"/>
+                </a:solidFill>
+                <a:effectLst/>
+                <a:latin typeface="-apple-system"/>
+              </a:rPr>
+              <a:t>It is hard to </a:t>
             </a:r>
             <a:r>
-              <a:rPr lang="en-IN" dirty="0"/>
-              <a:t>, what is difficult if we don’t have this system in place)</a:t>
+              <a:rPr lang="en-IN" b="0" i="0" dirty="0">
+                <a:solidFill>
+                  <a:srgbClr val="242424"/>
+                </a:solidFill>
+                <a:effectLst/>
+                <a:latin typeface="-apple-system"/>
+              </a:rPr>
+              <a:t>find the availability of an interviewer</a:t>
             </a:r>
+            <a:r>
+              <a:rPr lang="en-US" b="0" i="0" dirty="0">
+                <a:solidFill>
+                  <a:srgbClr val="242424"/>
+                </a:solidFill>
+                <a:effectLst/>
+                <a:latin typeface="-apple-system"/>
+              </a:rPr>
+              <a:t>.</a:t>
+            </a:r>
+          </a:p>
+          <a:p>
+            <a:pPr>
+              <a:buFont typeface="Wingdings" panose="05000000000000000000" pitchFamily="2" charset="2"/>
+              <a:buChar char="v"/>
+            </a:pPr>
+            <a:endParaRPr lang="en-US" dirty="0">
+              <a:solidFill>
+                <a:srgbClr val="242424"/>
+              </a:solidFill>
+              <a:latin typeface="-apple-system"/>
+            </a:endParaRPr>
+          </a:p>
+          <a:p>
+            <a:pPr>
+              <a:buFont typeface="Wingdings" panose="05000000000000000000" pitchFamily="2" charset="2"/>
+              <a:buChar char="v"/>
+            </a:pPr>
+            <a:r>
+              <a:rPr lang="en-US" dirty="0">
+                <a:solidFill>
+                  <a:srgbClr val="242424"/>
+                </a:solidFill>
+                <a:latin typeface="-apple-system"/>
+              </a:rPr>
+              <a:t>It is hard to measure the performance of each interviewer.</a:t>
+            </a:r>
+          </a:p>
+          <a:p>
+            <a:pPr>
+              <a:buFont typeface="Wingdings" panose="05000000000000000000" pitchFamily="2" charset="2"/>
+              <a:buChar char="v"/>
+            </a:pPr>
+            <a:endParaRPr lang="en-US" dirty="0">
+              <a:solidFill>
+                <a:srgbClr val="242424"/>
+              </a:solidFill>
+              <a:latin typeface="-apple-system"/>
+            </a:endParaRPr>
+          </a:p>
+          <a:p>
+            <a:pPr>
+              <a:buFont typeface="Wingdings" panose="05000000000000000000" pitchFamily="2" charset="2"/>
+              <a:buChar char="v"/>
+            </a:pPr>
+            <a:endParaRPr lang="en-IN" dirty="0"/>
           </a:p>
         </p:txBody>
       </p:sp>
@@ -21221,9 +21853,85 @@
               <a:buChar char="v"/>
             </a:pPr>
             <a:r>
-              <a:rPr lang="en-IN" dirty="0"/>
-              <a:t>List all features and add your High Level Architecture </a:t>
+              <a:rPr lang="en-US" dirty="0">
+                <a:solidFill>
+                  <a:srgbClr val="242424"/>
+                </a:solidFill>
+                <a:latin typeface="-apple-system"/>
+              </a:rPr>
+              <a:t>I</a:t>
             </a:r>
+            <a:r>
+              <a:rPr lang="en-US" b="0" i="0" dirty="0">
+                <a:solidFill>
+                  <a:srgbClr val="242424"/>
+                </a:solidFill>
+                <a:effectLst/>
+                <a:latin typeface="-apple-system"/>
+              </a:rPr>
+              <a:t>t is easy o collect the availability of the interviewers for the drive within a particular interval of time.</a:t>
+            </a:r>
+          </a:p>
+          <a:p>
+            <a:pPr>
+              <a:buFont typeface="Wingdings" panose="05000000000000000000" pitchFamily="2" charset="2"/>
+              <a:buChar char="v"/>
+            </a:pPr>
+            <a:endParaRPr lang="en-US" dirty="0">
+              <a:solidFill>
+                <a:srgbClr val="242424"/>
+              </a:solidFill>
+              <a:latin typeface="-apple-system"/>
+            </a:endParaRPr>
+          </a:p>
+          <a:p>
+            <a:pPr>
+              <a:buFont typeface="Wingdings" panose="05000000000000000000" pitchFamily="2" charset="2"/>
+              <a:buChar char="v"/>
+            </a:pPr>
+            <a:r>
+              <a:rPr lang="en-US" dirty="0">
+                <a:solidFill>
+                  <a:srgbClr val="242424"/>
+                </a:solidFill>
+                <a:latin typeface="-apple-system"/>
+              </a:rPr>
+              <a:t>It is easy for an interviewer to track the performance.</a:t>
+            </a:r>
+          </a:p>
+          <a:p>
+            <a:pPr>
+              <a:buFont typeface="Wingdings" panose="05000000000000000000" pitchFamily="2" charset="2"/>
+              <a:buChar char="v"/>
+            </a:pPr>
+            <a:endParaRPr lang="en-US" dirty="0">
+              <a:solidFill>
+                <a:srgbClr val="242424"/>
+              </a:solidFill>
+              <a:latin typeface="-apple-system"/>
+            </a:endParaRPr>
+          </a:p>
+          <a:p>
+            <a:pPr>
+              <a:buFont typeface="Wingdings" panose="05000000000000000000" pitchFamily="2" charset="2"/>
+              <a:buChar char="v"/>
+            </a:pPr>
+            <a:r>
+              <a:rPr lang="en-US" dirty="0">
+                <a:solidFill>
+                  <a:srgbClr val="242424"/>
+                </a:solidFill>
+                <a:latin typeface="-apple-system"/>
+              </a:rPr>
+              <a:t>It is helpful for a Management person to track his/her performance and to track individual interviewer’s performance as well.</a:t>
+            </a:r>
+          </a:p>
+          <a:p>
+            <a:pPr>
+              <a:buFont typeface="Wingdings" panose="05000000000000000000" pitchFamily="2" charset="2"/>
+              <a:buChar char="v"/>
+            </a:pPr>
+            <a:endParaRPr lang="en-IN" dirty="0"/>
           </a:p>
         </p:txBody>
       </p:sp>
@@ -21257,12 +21965,77 @@
           <a:chExt cx="0" cy="0"/>
         </a:xfrm>
       </p:grpSpPr>
+      <p:pic>
+        <p:nvPicPr>
+          <p:cNvPr id="4" name="Picture 4">
+            <a:extLst>
+              <a:ext uri="{FF2B5EF4-FFF2-40B4-BE49-F238E27FC236}">
+                <a16:creationId xmlns:a16="http://schemas.microsoft.com/office/drawing/2014/main" id="{DA5FD045-F6EB-4AF2-ADD9-49A62F20E5AF}"/>
+              </a:ext>
+            </a:extLst>
+          </p:cNvPr>
+          <p:cNvPicPr>
+            <a:picLocks noGrp="1" noChangeAspect="1"/>
+          </p:cNvPicPr>
+          <p:nvPr>
+            <p:ph idx="1"/>
+          </p:nvPr>
+        </p:nvPicPr>
+        <p:blipFill>
+          <a:blip r:embed="rId2">
+            <a:extLst>
+              <a:ext uri="{28A0092B-C50C-407E-A947-70E740481C1C}">
+                <a14:useLocalDpi xmlns:a14="http://schemas.microsoft.com/office/drawing/2010/main" val="0"/>
+              </a:ext>
+            </a:extLst>
+          </a:blip>
+          <a:stretch>
+            <a:fillRect/>
+          </a:stretch>
+        </p:blipFill>
+        <p:spPr>
+          <a:xfrm>
+            <a:off x="1127835" y="530225"/>
+            <a:ext cx="10377985" cy="5933506"/>
+          </a:xfrm>
+        </p:spPr>
+      </p:pic>
+    </p:spTree>
+    <p:extLst>
+      <p:ext uri="{BB962C8B-B14F-4D97-AF65-F5344CB8AC3E}">
+        <p14:creationId xmlns:p14="http://schemas.microsoft.com/office/powerpoint/2010/main" val="2940111900"/>
+      </p:ext>
+    </p:extLst>
+  </p:cSld>
+  <p:clrMapOvr>
+    <a:masterClrMapping/>
+  </p:clrMapOvr>
+</p:sld>
+</file>
+
+<file path=ppt/slides/slide7.xml><?xml version="1.0" encoding="utf-8"?>
+<p:sld xmlns:a="http://schemas.openxmlformats.org/drawingml/2006/main" xmlns:r="http://schemas.openxmlformats.org/officeDocument/2006/relationships" xmlns:p="http://schemas.openxmlformats.org/presentationml/2006/main">
+  <p:cSld>
+    <p:spTree>
+      <p:nvGrpSpPr>
+        <p:cNvPr id="1" name=""/>
+        <p:cNvGrpSpPr/>
+        <p:nvPr/>
+      </p:nvGrpSpPr>
+      <p:grpSpPr>
+        <a:xfrm>
+          <a:off x="0" y="0"/>
+          <a:ext cx="0" cy="0"/>
+          <a:chOff x="0" y="0"/>
+          <a:chExt cx="0" cy="0"/>
+        </a:xfrm>
+      </p:grpSpPr>
       <p:sp>
         <p:nvSpPr>
           <p:cNvPr id="2" name="Title 1">
             <a:extLst>
               <a:ext uri="{FF2B5EF4-FFF2-40B4-BE49-F238E27FC236}">
-                <a16:creationId xmlns:a16="http://schemas.microsoft.com/office/drawing/2014/main" id="{F8958DDC-3FB2-1E52-6CBB-472269ACC0FC}"/>
+                <a16:creationId xmlns:a16="http://schemas.microsoft.com/office/drawing/2014/main" id="{094A78D8-F6D6-CCCF-B3EA-45FB48F5B781}"/>
               </a:ext>
             </a:extLst>
           </p:cNvPr>
@@ -21279,9 +22052,10 @@
           <a:lstStyle/>
           <a:p>
             <a:r>
-              <a:rPr lang="en-IN" dirty="0"/>
-              <a:t>EXECUTION JOURNEY</a:t>
+              <a:rPr lang="en-US" dirty="0"/>
+              <a:t>Execution journey</a:t>
             </a:r>
+            <a:endParaRPr lang="en-IN" dirty="0"/>
           </a:p>
         </p:txBody>
       </p:sp>
@@ -21290,7 +22064,7 @@
           <p:cNvPr id="3" name="Content Placeholder 2">
             <a:extLst>
               <a:ext uri="{FF2B5EF4-FFF2-40B4-BE49-F238E27FC236}">
-                <a16:creationId xmlns:a16="http://schemas.microsoft.com/office/drawing/2014/main" id="{5EE8EA71-4A04-7196-092F-0E6B6FEEC877}"/>
+                <a16:creationId xmlns:a16="http://schemas.microsoft.com/office/drawing/2014/main" id="{5F1A2351-2CCD-6ABA-8CFD-67AFC77C3777}"/>
               </a:ext>
             </a:extLst>
           </p:cNvPr>
@@ -21301,9 +22075,16 @@
             <p:ph idx="1"/>
           </p:nvPr>
         </p:nvSpPr>
-        <p:spPr/>
+        <p:spPr>
+          <a:xfrm>
+            <a:off x="1024128" y="1971344"/>
+            <a:ext cx="10472215" cy="4442270"/>
+          </a:xfrm>
+        </p:spPr>
         <p:txBody>
-          <a:bodyPr/>
+          <a:bodyPr numCol="2">
+            <a:normAutofit fontScale="92500" lnSpcReduction="10000"/>
+          </a:bodyPr>
           <a:lstStyle/>
           <a:p>
             <a:pPr>
@@ -21311,8 +22092,30 @@
               <a:buChar char="v"/>
             </a:pPr>
             <a:r>
-              <a:rPr lang="en-IN" dirty="0"/>
-              <a:t>List all Activities Done</a:t>
+              <a:rPr lang="en-US" b="0" i="0" dirty="0">
+                <a:solidFill>
+                  <a:srgbClr val="242424"/>
+                </a:solidFill>
+                <a:effectLst/>
+                <a:latin typeface="-apple-system"/>
+              </a:rPr>
+              <a:t>User stories</a:t>
+            </a:r>
+            <a:endParaRPr lang="en-IN" dirty="0"/>
+          </a:p>
+          <a:p>
+            <a:pPr>
+              <a:buFont typeface="Wingdings" panose="05000000000000000000" pitchFamily="2" charset="2"/>
+              <a:buChar char="v"/>
+            </a:pPr>
+            <a:r>
+              <a:rPr lang="en-US" dirty="0">
+                <a:solidFill>
+                  <a:srgbClr val="242424"/>
+                </a:solidFill>
+                <a:latin typeface="-apple-system"/>
+              </a:rPr>
+              <a:t>Functional and Non-Functional          Requirements</a:t>
             </a:r>
           </a:p>
           <a:p>
@@ -21321,8 +22124,13 @@
               <a:buChar char="v"/>
             </a:pPr>
             <a:r>
-              <a:rPr lang="en-IN" dirty="0"/>
-              <a:t>List..</a:t>
+              <a:rPr lang="en-US" dirty="0">
+                <a:solidFill>
+                  <a:srgbClr val="242424"/>
+                </a:solidFill>
+                <a:latin typeface="-apple-system"/>
+              </a:rPr>
+              <a:t>Wireframe</a:t>
             </a:r>
           </a:p>
           <a:p>
@@ -21331,16 +22139,247 @@
               <a:buChar char="v"/>
             </a:pPr>
             <a:r>
-              <a:rPr lang="en-IN" dirty="0"/>
-              <a:t>Lis…</a:t>
+              <a:rPr lang="en-US" dirty="0">
+                <a:solidFill>
+                  <a:srgbClr val="242424"/>
+                </a:solidFill>
+                <a:latin typeface="-apple-system"/>
+              </a:rPr>
+              <a:t> HTML Template</a:t>
             </a:r>
+          </a:p>
+          <a:p>
+            <a:pPr>
+              <a:buFont typeface="Wingdings" panose="05000000000000000000" pitchFamily="2" charset="2"/>
+              <a:buChar char="v"/>
+            </a:pPr>
+            <a:r>
+              <a:rPr lang="en-US" dirty="0">
+                <a:solidFill>
+                  <a:srgbClr val="242424"/>
+                </a:solidFill>
+                <a:latin typeface="-apple-system"/>
+              </a:rPr>
+              <a:t> Angular Components</a:t>
+            </a:r>
+          </a:p>
+          <a:p>
+            <a:pPr>
+              <a:buFont typeface="Wingdings" panose="05000000000000000000" pitchFamily="2" charset="2"/>
+              <a:buChar char="v"/>
+            </a:pPr>
+            <a:r>
+              <a:rPr lang="en-US" dirty="0">
+                <a:solidFill>
+                  <a:srgbClr val="242424"/>
+                </a:solidFill>
+                <a:latin typeface="-apple-system"/>
+              </a:rPr>
+              <a:t>Web API</a:t>
+            </a:r>
+          </a:p>
+          <a:p>
+            <a:pPr>
+              <a:buFont typeface="Wingdings" panose="05000000000000000000" pitchFamily="2" charset="2"/>
+              <a:buChar char="v"/>
+            </a:pPr>
+            <a:r>
+              <a:rPr lang="en-US" dirty="0">
+                <a:solidFill>
+                  <a:srgbClr val="242424"/>
+                </a:solidFill>
+                <a:latin typeface="-apple-system"/>
+              </a:rPr>
+              <a:t>Integration</a:t>
+            </a:r>
+            <a:endParaRPr lang="en-IN" dirty="0"/>
+          </a:p>
+          <a:p>
+            <a:pPr>
+              <a:buFont typeface="Wingdings" panose="05000000000000000000" pitchFamily="2" charset="2"/>
+              <a:buChar char="v"/>
+            </a:pPr>
+            <a:r>
+              <a:rPr lang="en-US" dirty="0">
+                <a:solidFill>
+                  <a:srgbClr val="242424"/>
+                </a:solidFill>
+                <a:latin typeface="-apple-system"/>
+              </a:rPr>
+              <a:t>Unit Testing</a:t>
+            </a:r>
+          </a:p>
+          <a:p>
+            <a:pPr>
+              <a:buFont typeface="Wingdings" panose="05000000000000000000" pitchFamily="2" charset="2"/>
+              <a:buChar char="v"/>
+            </a:pPr>
+            <a:r>
+              <a:rPr lang="en-US" dirty="0">
+                <a:solidFill>
+                  <a:srgbClr val="242424"/>
+                </a:solidFill>
+                <a:latin typeface="-apple-system"/>
+              </a:rPr>
+              <a:t>Set-up Documentation</a:t>
+            </a:r>
+          </a:p>
+          <a:p>
+            <a:pPr>
+              <a:buFont typeface="Wingdings" panose="05000000000000000000" pitchFamily="2" charset="2"/>
+              <a:buChar char="v"/>
+            </a:pPr>
+            <a:r>
+              <a:rPr lang="en-US" dirty="0">
+                <a:solidFill>
+                  <a:srgbClr val="242424"/>
+                </a:solidFill>
+                <a:latin typeface="-apple-system"/>
+              </a:rPr>
+              <a:t>SonarQube</a:t>
+            </a:r>
+          </a:p>
+          <a:p>
+            <a:pPr>
+              <a:buFont typeface="Wingdings" panose="05000000000000000000" pitchFamily="2" charset="2"/>
+              <a:buChar char="v"/>
+            </a:pPr>
+            <a:r>
+              <a:rPr lang="en-US" dirty="0">
+                <a:solidFill>
+                  <a:srgbClr val="242424"/>
+                </a:solidFill>
+                <a:latin typeface="-apple-system"/>
+              </a:rPr>
+              <a:t>Linting</a:t>
+            </a:r>
+          </a:p>
+          <a:p>
+            <a:pPr>
+              <a:buFont typeface="Wingdings" panose="05000000000000000000" pitchFamily="2" charset="2"/>
+              <a:buChar char="v"/>
+            </a:pPr>
+            <a:r>
+              <a:rPr lang="en-US" dirty="0">
+                <a:solidFill>
+                  <a:srgbClr val="242424"/>
+                </a:solidFill>
+                <a:latin typeface="-apple-system"/>
+              </a:rPr>
+              <a:t>Light House</a:t>
+            </a:r>
+          </a:p>
+          <a:p>
+            <a:pPr>
+              <a:buFont typeface="Wingdings" panose="05000000000000000000" pitchFamily="2" charset="2"/>
+              <a:buChar char="v"/>
+            </a:pPr>
+            <a:r>
+              <a:rPr lang="en-US" dirty="0">
+                <a:solidFill>
+                  <a:srgbClr val="242424"/>
+                </a:solidFill>
+                <a:latin typeface="-apple-system"/>
+              </a:rPr>
+              <a:t>Deployment in IIS</a:t>
+            </a:r>
+          </a:p>
+          <a:p>
+            <a:pPr>
+              <a:buFont typeface="Wingdings" panose="05000000000000000000" pitchFamily="2" charset="2"/>
+              <a:buChar char="v"/>
+            </a:pPr>
+            <a:r>
+              <a:rPr lang="en-US" dirty="0">
+                <a:solidFill>
+                  <a:srgbClr val="242424"/>
+                </a:solidFill>
+                <a:latin typeface="-apple-system"/>
+              </a:rPr>
+              <a:t>JMeter</a:t>
+            </a:r>
+          </a:p>
+          <a:p>
+            <a:pPr>
+              <a:buFont typeface="Wingdings" panose="05000000000000000000" pitchFamily="2" charset="2"/>
+              <a:buChar char="v"/>
+            </a:pPr>
+            <a:r>
+              <a:rPr lang="en-US" dirty="0">
+                <a:solidFill>
+                  <a:srgbClr val="242424"/>
+                </a:solidFill>
+                <a:latin typeface="-apple-system"/>
+              </a:rPr>
+              <a:t>High Level Design</a:t>
+            </a:r>
+          </a:p>
+          <a:p>
+            <a:pPr>
+              <a:buFont typeface="Wingdings" panose="05000000000000000000" pitchFamily="2" charset="2"/>
+              <a:buChar char="v"/>
+            </a:pPr>
+            <a:r>
+              <a:rPr lang="en-US" dirty="0">
+                <a:solidFill>
+                  <a:srgbClr val="242424"/>
+                </a:solidFill>
+                <a:latin typeface="-apple-system"/>
+              </a:rPr>
+              <a:t>Low Level Design</a:t>
+            </a:r>
+          </a:p>
+          <a:p>
+            <a:pPr>
+              <a:buFont typeface="Wingdings" panose="05000000000000000000" pitchFamily="2" charset="2"/>
+              <a:buChar char="v"/>
+            </a:pPr>
+            <a:r>
+              <a:rPr lang="en-US" dirty="0">
+                <a:solidFill>
+                  <a:srgbClr val="242424"/>
+                </a:solidFill>
+                <a:latin typeface="-apple-system"/>
+              </a:rPr>
+              <a:t>Test Scenarios</a:t>
+            </a:r>
+          </a:p>
+          <a:p>
+            <a:pPr marL="0" indent="0">
+              <a:buNone/>
+            </a:pPr>
+            <a:endParaRPr lang="en-US" dirty="0">
+              <a:solidFill>
+                <a:srgbClr val="242424"/>
+              </a:solidFill>
+              <a:latin typeface="-apple-system"/>
+            </a:endParaRPr>
+          </a:p>
+          <a:p>
+            <a:pPr>
+              <a:buFont typeface="Wingdings" panose="05000000000000000000" pitchFamily="2" charset="2"/>
+              <a:buChar char="v"/>
+            </a:pPr>
+            <a:endParaRPr lang="en-US" dirty="0">
+              <a:solidFill>
+                <a:srgbClr val="242424"/>
+              </a:solidFill>
+              <a:latin typeface="-apple-system"/>
+            </a:endParaRPr>
+          </a:p>
+          <a:p>
+            <a:pPr>
+              <a:buFont typeface="Wingdings" panose="05000000000000000000" pitchFamily="2" charset="2"/>
+              <a:buChar char="v"/>
+            </a:pPr>
+            <a:endParaRPr lang="en-IN" dirty="0"/>
           </a:p>
         </p:txBody>
       </p:sp>
     </p:spTree>
     <p:extLst>
       <p:ext uri="{BB962C8B-B14F-4D97-AF65-F5344CB8AC3E}">
-        <p14:creationId xmlns:p14="http://schemas.microsoft.com/office/powerpoint/2010/main" val="3862828603"/>
+        <p14:creationId xmlns:p14="http://schemas.microsoft.com/office/powerpoint/2010/main" val="3792372931"/>
       </p:ext>
     </p:extLst>
   </p:cSld>
@@ -21350,7 +22389,7 @@
 </p:sld>
 </file>
 
-<file path=ppt/slides/slide7.xml><?xml version="1.0" encoding="utf-8"?>
+<file path=ppt/slides/slide8.xml><?xml version="1.0" encoding="utf-8"?>
 <p:sld xmlns:a="http://schemas.openxmlformats.org/drawingml/2006/main" xmlns:r="http://schemas.openxmlformats.org/officeDocument/2006/relationships" xmlns:p="http://schemas.openxmlformats.org/presentationml/2006/main">
   <p:cSld>
     <p:spTree>
@@ -21411,7 +22450,7 @@
             <p:ph idx="1"/>
             <p:extLst>
               <p:ext uri="{D42A27DB-BD31-4B8C-83A1-F6EECF244321}">
-                <p14:modId xmlns:p14="http://schemas.microsoft.com/office/powerpoint/2010/main" val="1083707656"/>
+                <p14:modId xmlns:p14="http://schemas.microsoft.com/office/powerpoint/2010/main" val="2824528029"/>
               </p:ext>
             </p:extLst>
           </p:nvPr>
@@ -21735,7 +22774,7 @@
 </p:sld>
 </file>
 
-<file path=ppt/slides/slide8.xml><?xml version="1.0" encoding="utf-8"?>
+<file path=ppt/slides/slide9.xml><?xml version="1.0" encoding="utf-8"?>
 <p:sld xmlns:a="http://schemas.openxmlformats.org/drawingml/2006/main" xmlns:r="http://schemas.openxmlformats.org/officeDocument/2006/relationships" xmlns:p="http://schemas.openxmlformats.org/presentationml/2006/main">
   <p:cSld>
     <p:spTree>
@@ -21806,9 +22845,95 @@
               <a:buChar char="v"/>
             </a:pPr>
             <a:r>
-              <a:rPr lang="en-IN" dirty="0"/>
-              <a:t> List all the technical stack used </a:t>
+              <a:rPr lang="en-US" dirty="0"/>
+              <a:t>Asp </a:t>
             </a:r>
+            <a:r>
+              <a:rPr lang="en-US" dirty="0" err="1"/>
+              <a:t>Dotnet</a:t>
+            </a:r>
+            <a:r>
+              <a:rPr lang="en-US" dirty="0"/>
+              <a:t> Core 6.0</a:t>
+            </a:r>
+          </a:p>
+          <a:p>
+            <a:pPr>
+              <a:buFont typeface="Wingdings" panose="05000000000000000000" pitchFamily="2" charset="2"/>
+              <a:buChar char="v"/>
+            </a:pPr>
+            <a:r>
+              <a:rPr lang="en-US" dirty="0"/>
+              <a:t>Angular 13</a:t>
+            </a:r>
+          </a:p>
+          <a:p>
+            <a:pPr>
+              <a:buFont typeface="Wingdings" panose="05000000000000000000" pitchFamily="2" charset="2"/>
+              <a:buChar char="v"/>
+            </a:pPr>
+            <a:r>
+              <a:rPr lang="en-US" dirty="0"/>
+              <a:t>Visual Studio Code</a:t>
+            </a:r>
+          </a:p>
+          <a:p>
+            <a:pPr>
+              <a:buFont typeface="Wingdings" panose="05000000000000000000" pitchFamily="2" charset="2"/>
+              <a:buChar char="v"/>
+            </a:pPr>
+            <a:r>
+              <a:rPr lang="en-US" dirty="0"/>
+              <a:t>Node </a:t>
+            </a:r>
+            <a:r>
+              <a:rPr lang="en-US" dirty="0" err="1"/>
+              <a:t>js</a:t>
+            </a:r>
+            <a:endParaRPr lang="en-US" dirty="0"/>
+          </a:p>
+          <a:p>
+            <a:pPr>
+              <a:buFont typeface="Wingdings" panose="05000000000000000000" pitchFamily="2" charset="2"/>
+              <a:buChar char="v"/>
+            </a:pPr>
+            <a:r>
+              <a:rPr lang="en-US" dirty="0"/>
+              <a:t>Angular</a:t>
+            </a:r>
+          </a:p>
+          <a:p>
+            <a:pPr>
+              <a:buFont typeface="Wingdings" panose="05000000000000000000" pitchFamily="2" charset="2"/>
+              <a:buChar char="v"/>
+            </a:pPr>
+            <a:r>
+              <a:rPr lang="en-US" dirty="0" err="1"/>
+              <a:t>SonarQube</a:t>
+            </a:r>
+            <a:endParaRPr lang="en-US" dirty="0"/>
+          </a:p>
+          <a:p>
+            <a:pPr>
+              <a:buFont typeface="Wingdings" panose="05000000000000000000" pitchFamily="2" charset="2"/>
+              <a:buChar char="v"/>
+            </a:pPr>
+            <a:r>
+              <a:rPr lang="en-US" dirty="0" err="1"/>
+              <a:t>Jdk</a:t>
+            </a:r>
+            <a:endParaRPr lang="en-US" dirty="0"/>
+          </a:p>
+          <a:p>
+            <a:pPr>
+              <a:buFont typeface="Wingdings" panose="05000000000000000000" pitchFamily="2" charset="2"/>
+              <a:buChar char="v"/>
+            </a:pPr>
+            <a:r>
+              <a:rPr lang="en-US" dirty="0"/>
+              <a:t>JMeter</a:t>
+            </a:r>
+            <a:endParaRPr lang="en-IN" dirty="0"/>
           </a:p>
         </p:txBody>
       </p:sp>
@@ -21816,96 +22941,6 @@
     <p:extLst>
       <p:ext uri="{BB962C8B-B14F-4D97-AF65-F5344CB8AC3E}">
         <p14:creationId xmlns:p14="http://schemas.microsoft.com/office/powerpoint/2010/main" val="1251030418"/>
-      </p:ext>
-    </p:extLst>
-  </p:cSld>
-  <p:clrMapOvr>
-    <a:masterClrMapping/>
-  </p:clrMapOvr>
-</p:sld>
-</file>
-
-<file path=ppt/slides/slide9.xml><?xml version="1.0" encoding="utf-8"?>
-<p:sld xmlns:a="http://schemas.openxmlformats.org/drawingml/2006/main" xmlns:r="http://schemas.openxmlformats.org/officeDocument/2006/relationships" xmlns:p="http://schemas.openxmlformats.org/presentationml/2006/main">
-  <p:cSld>
-    <p:spTree>
-      <p:nvGrpSpPr>
-        <p:cNvPr id="1" name=""/>
-        <p:cNvGrpSpPr/>
-        <p:nvPr/>
-      </p:nvGrpSpPr>
-      <p:grpSpPr>
-        <a:xfrm>
-          <a:off x="0" y="0"/>
-          <a:ext cx="0" cy="0"/>
-          <a:chOff x="0" y="0"/>
-          <a:chExt cx="0" cy="0"/>
-        </a:xfrm>
-      </p:grpSpPr>
-      <p:sp>
-        <p:nvSpPr>
-          <p:cNvPr id="2" name="Title 1">
-            <a:extLst>
-              <a:ext uri="{FF2B5EF4-FFF2-40B4-BE49-F238E27FC236}">
-                <a16:creationId xmlns:a16="http://schemas.microsoft.com/office/drawing/2014/main" id="{D0FC0C6B-78B2-6B27-9973-596280C5D6E3}"/>
-              </a:ext>
-            </a:extLst>
-          </p:cNvPr>
-          <p:cNvSpPr>
-            <a:spLocks noGrp="1"/>
-          </p:cNvSpPr>
-          <p:nvPr>
-            <p:ph type="title"/>
-          </p:nvPr>
-        </p:nvSpPr>
-        <p:spPr/>
-        <p:txBody>
-          <a:bodyPr/>
-          <a:lstStyle/>
-          <a:p>
-            <a:r>
-              <a:rPr lang="en-IN" dirty="0"/>
-              <a:t>DEMO</a:t>
-            </a:r>
-          </a:p>
-        </p:txBody>
-      </p:sp>
-      <p:sp>
-        <p:nvSpPr>
-          <p:cNvPr id="3" name="Content Placeholder 2">
-            <a:extLst>
-              <a:ext uri="{FF2B5EF4-FFF2-40B4-BE49-F238E27FC236}">
-                <a16:creationId xmlns:a16="http://schemas.microsoft.com/office/drawing/2014/main" id="{4B32D1D6-8BDE-BA31-ACBD-E5D8E3F5486C}"/>
-              </a:ext>
-            </a:extLst>
-          </p:cNvPr>
-          <p:cNvSpPr>
-            <a:spLocks noGrp="1"/>
-          </p:cNvSpPr>
-          <p:nvPr>
-            <p:ph idx="1"/>
-          </p:nvPr>
-        </p:nvSpPr>
-        <p:spPr/>
-        <p:txBody>
-          <a:bodyPr/>
-          <a:lstStyle/>
-          <a:p>
-            <a:pPr>
-              <a:buFont typeface="Wingdings" panose="05000000000000000000" pitchFamily="2" charset="2"/>
-              <a:buChar char="v"/>
-            </a:pPr>
-            <a:r>
-              <a:rPr lang="en-IN" dirty="0"/>
-              <a:t> </a:t>
-            </a:r>
-          </a:p>
-        </p:txBody>
-      </p:sp>
-    </p:spTree>
-    <p:extLst>
-      <p:ext uri="{BB962C8B-B14F-4D97-AF65-F5344CB8AC3E}">
-        <p14:creationId xmlns:p14="http://schemas.microsoft.com/office/powerpoint/2010/main" val="2823406662"/>
       </p:ext>
     </p:extLst>
   </p:cSld>

</xml_diff>